<commit_message>
added screenshots to the powerpoint changed firstPage a bit
</commit_message>
<xml_diff>
--- a/Project Docs/group07DCSPRikkAnderson.pptx
+++ b/Project Docs/group07DCSPRikkAnderson.pptx
@@ -127,6 +127,11 @@
       </a:defRPr>
     </a:lvl9pPr>
   </p:defaultTextStyle>
+  <p:extLst>
+    <p:ext uri="{EFAFB233-063F-42B5-8137-9DF3F51BA10A}">
+      <p15:sldGuideLst xmlns:p15="http://schemas.microsoft.com/office/powerpoint/2012/main"/>
+    </p:ext>
+  </p:extLst>
 </p:presentation>
 </file>
 
@@ -276,38 +281,37 @@
           <a:p>
             <a:pPr lvl="0"/>
             <a:r>
-              <a:rPr lang="en-US" smtClean="0"/>
+              <a:rPr lang="en-US"/>
               <a:t>Click to edit Master text styles</a:t>
             </a:r>
           </a:p>
           <a:p>
             <a:pPr lvl="1"/>
             <a:r>
-              <a:rPr lang="en-US" smtClean="0"/>
+              <a:rPr lang="en-US"/>
               <a:t>Second level</a:t>
             </a:r>
           </a:p>
           <a:p>
             <a:pPr lvl="2"/>
             <a:r>
-              <a:rPr lang="en-US" smtClean="0"/>
+              <a:rPr lang="en-US"/>
               <a:t>Third level</a:t>
             </a:r>
           </a:p>
           <a:p>
             <a:pPr lvl="3"/>
             <a:r>
-              <a:rPr lang="en-US" smtClean="0"/>
+              <a:rPr lang="en-US"/>
               <a:t>Fourth level</a:t>
             </a:r>
           </a:p>
           <a:p>
             <a:pPr lvl="4"/>
             <a:r>
-              <a:rPr lang="en-US" smtClean="0"/>
+              <a:rPr lang="en-US"/>
               <a:t>Fifth level</a:t>
             </a:r>
-            <a:endParaRPr lang="en-US"/>
           </a:p>
         </p:txBody>
       </p:sp>
@@ -858,10 +862,9 @@
           </a:lstStyle>
           <a:p>
             <a:r>
-              <a:rPr lang="en-US" smtClean="0"/>
+              <a:rPr lang="en-US"/>
               <a:t>Click to edit Master title style</a:t>
             </a:r>
-            <a:endParaRPr lang="en-US"/>
           </a:p>
         </p:txBody>
       </p:sp>
@@ -923,10 +926,9 @@
           </a:lstStyle>
           <a:p>
             <a:r>
-              <a:rPr lang="en-US" smtClean="0"/>
+              <a:rPr lang="en-US"/>
               <a:t>Click to edit Master subtitle style</a:t>
             </a:r>
-            <a:endParaRPr lang="en-US"/>
           </a:p>
         </p:txBody>
       </p:sp>
@@ -1041,10 +1043,9 @@
           <a:lstStyle/>
           <a:p>
             <a:r>
-              <a:rPr lang="en-US" smtClean="0"/>
+              <a:rPr lang="en-US"/>
               <a:t>Click to edit Master title style</a:t>
             </a:r>
-            <a:endParaRPr lang="en-US"/>
           </a:p>
         </p:txBody>
       </p:sp>
@@ -1065,38 +1066,37 @@
           <a:p>
             <a:pPr lvl="0"/>
             <a:r>
-              <a:rPr lang="en-US" smtClean="0"/>
+              <a:rPr lang="en-US"/>
               <a:t>Click to edit Master text styles</a:t>
             </a:r>
           </a:p>
           <a:p>
             <a:pPr lvl="1"/>
             <a:r>
-              <a:rPr lang="en-US" smtClean="0"/>
+              <a:rPr lang="en-US"/>
               <a:t>Second level</a:t>
             </a:r>
           </a:p>
           <a:p>
             <a:pPr lvl="2"/>
             <a:r>
-              <a:rPr lang="en-US" smtClean="0"/>
+              <a:rPr lang="en-US"/>
               <a:t>Third level</a:t>
             </a:r>
           </a:p>
           <a:p>
             <a:pPr lvl="3"/>
             <a:r>
-              <a:rPr lang="en-US" smtClean="0"/>
+              <a:rPr lang="en-US"/>
               <a:t>Fourth level</a:t>
             </a:r>
           </a:p>
           <a:p>
             <a:pPr lvl="4"/>
             <a:r>
-              <a:rPr lang="en-US" smtClean="0"/>
+              <a:rPr lang="en-US"/>
               <a:t>Fifth level</a:t>
             </a:r>
-            <a:endParaRPr lang="en-US"/>
           </a:p>
         </p:txBody>
       </p:sp>
@@ -1216,10 +1216,9 @@
           <a:lstStyle/>
           <a:p>
             <a:r>
-              <a:rPr lang="en-US" smtClean="0"/>
+              <a:rPr lang="en-US"/>
               <a:t>Click to edit Master title style</a:t>
             </a:r>
-            <a:endParaRPr lang="en-US"/>
           </a:p>
         </p:txBody>
       </p:sp>
@@ -1245,38 +1244,37 @@
           <a:p>
             <a:pPr lvl="0"/>
             <a:r>
-              <a:rPr lang="en-US" smtClean="0"/>
+              <a:rPr lang="en-US"/>
               <a:t>Click to edit Master text styles</a:t>
             </a:r>
           </a:p>
           <a:p>
             <a:pPr lvl="1"/>
             <a:r>
-              <a:rPr lang="en-US" smtClean="0"/>
+              <a:rPr lang="en-US"/>
               <a:t>Second level</a:t>
             </a:r>
           </a:p>
           <a:p>
             <a:pPr lvl="2"/>
             <a:r>
-              <a:rPr lang="en-US" smtClean="0"/>
+              <a:rPr lang="en-US"/>
               <a:t>Third level</a:t>
             </a:r>
           </a:p>
           <a:p>
             <a:pPr lvl="3"/>
             <a:r>
-              <a:rPr lang="en-US" smtClean="0"/>
+              <a:rPr lang="en-US"/>
               <a:t>Fourth level</a:t>
             </a:r>
           </a:p>
           <a:p>
             <a:pPr lvl="4"/>
             <a:r>
-              <a:rPr lang="en-US" smtClean="0"/>
+              <a:rPr lang="en-US"/>
               <a:t>Fifth level</a:t>
             </a:r>
-            <a:endParaRPr lang="en-US"/>
           </a:p>
         </p:txBody>
       </p:sp>
@@ -1391,10 +1389,9 @@
           <a:lstStyle/>
           <a:p>
             <a:r>
-              <a:rPr lang="en-US" smtClean="0"/>
+              <a:rPr lang="en-US"/>
               <a:t>Click to edit Master title style</a:t>
             </a:r>
-            <a:endParaRPr lang="en-US"/>
           </a:p>
         </p:txBody>
       </p:sp>
@@ -1415,38 +1412,37 @@
           <a:p>
             <a:pPr lvl="0"/>
             <a:r>
-              <a:rPr lang="en-US" smtClean="0"/>
+              <a:rPr lang="en-US"/>
               <a:t>Click to edit Master text styles</a:t>
             </a:r>
           </a:p>
           <a:p>
             <a:pPr lvl="1"/>
             <a:r>
-              <a:rPr lang="en-US" smtClean="0"/>
+              <a:rPr lang="en-US"/>
               <a:t>Second level</a:t>
             </a:r>
           </a:p>
           <a:p>
             <a:pPr lvl="2"/>
             <a:r>
-              <a:rPr lang="en-US" smtClean="0"/>
+              <a:rPr lang="en-US"/>
               <a:t>Third level</a:t>
             </a:r>
           </a:p>
           <a:p>
             <a:pPr lvl="3"/>
             <a:r>
-              <a:rPr lang="en-US" smtClean="0"/>
+              <a:rPr lang="en-US"/>
               <a:t>Fourth level</a:t>
             </a:r>
           </a:p>
           <a:p>
             <a:pPr lvl="4"/>
             <a:r>
-              <a:rPr lang="en-US" smtClean="0"/>
+              <a:rPr lang="en-US"/>
               <a:t>Fifth level</a:t>
             </a:r>
-            <a:endParaRPr lang="en-US"/>
           </a:p>
         </p:txBody>
       </p:sp>
@@ -1570,10 +1566,9 @@
           </a:lstStyle>
           <a:p>
             <a:r>
-              <a:rPr lang="en-US" smtClean="0"/>
+              <a:rPr lang="en-US"/>
               <a:t>Click to edit Master title style</a:t>
             </a:r>
-            <a:endParaRPr lang="en-US"/>
           </a:p>
         </p:txBody>
       </p:sp>
@@ -1690,7 +1685,7 @@
           <a:p>
             <a:pPr lvl="0"/>
             <a:r>
-              <a:rPr lang="en-US" smtClean="0"/>
+              <a:rPr lang="en-US"/>
               <a:t>Click to edit Master text styles</a:t>
             </a:r>
           </a:p>
@@ -1807,10 +1802,9 @@
           <a:lstStyle/>
           <a:p>
             <a:r>
-              <a:rPr lang="en-US" smtClean="0"/>
+              <a:rPr lang="en-US"/>
               <a:t>Click to edit Master title style</a:t>
             </a:r>
-            <a:endParaRPr lang="en-US"/>
           </a:p>
         </p:txBody>
       </p:sp>
@@ -1836,38 +1830,37 @@
           <a:p>
             <a:pPr lvl="0"/>
             <a:r>
-              <a:rPr lang="en-US" smtClean="0"/>
+              <a:rPr lang="en-US"/>
               <a:t>Click to edit Master text styles</a:t>
             </a:r>
           </a:p>
           <a:p>
             <a:pPr lvl="1"/>
             <a:r>
-              <a:rPr lang="en-US" smtClean="0"/>
+              <a:rPr lang="en-US"/>
               <a:t>Second level</a:t>
             </a:r>
           </a:p>
           <a:p>
             <a:pPr lvl="2"/>
             <a:r>
-              <a:rPr lang="en-US" smtClean="0"/>
+              <a:rPr lang="en-US"/>
               <a:t>Third level</a:t>
             </a:r>
           </a:p>
           <a:p>
             <a:pPr lvl="3"/>
             <a:r>
-              <a:rPr lang="en-US" smtClean="0"/>
+              <a:rPr lang="en-US"/>
               <a:t>Fourth level</a:t>
             </a:r>
           </a:p>
           <a:p>
             <a:pPr lvl="4"/>
             <a:r>
-              <a:rPr lang="en-US" smtClean="0"/>
+              <a:rPr lang="en-US"/>
               <a:t>Fifth level</a:t>
             </a:r>
-            <a:endParaRPr lang="en-US"/>
           </a:p>
         </p:txBody>
       </p:sp>
@@ -1893,38 +1886,37 @@
           <a:p>
             <a:pPr lvl="0"/>
             <a:r>
-              <a:rPr lang="en-US" smtClean="0"/>
+              <a:rPr lang="en-US"/>
               <a:t>Click to edit Master text styles</a:t>
             </a:r>
           </a:p>
           <a:p>
             <a:pPr lvl="1"/>
             <a:r>
-              <a:rPr lang="en-US" smtClean="0"/>
+              <a:rPr lang="en-US"/>
               <a:t>Second level</a:t>
             </a:r>
           </a:p>
           <a:p>
             <a:pPr lvl="2"/>
             <a:r>
-              <a:rPr lang="en-US" smtClean="0"/>
+              <a:rPr lang="en-US"/>
               <a:t>Third level</a:t>
             </a:r>
           </a:p>
           <a:p>
             <a:pPr lvl="3"/>
             <a:r>
-              <a:rPr lang="en-US" smtClean="0"/>
+              <a:rPr lang="en-US"/>
               <a:t>Fourth level</a:t>
             </a:r>
           </a:p>
           <a:p>
             <a:pPr lvl="4"/>
             <a:r>
-              <a:rPr lang="en-US" smtClean="0"/>
+              <a:rPr lang="en-US"/>
               <a:t>Fifth level</a:t>
             </a:r>
-            <a:endParaRPr lang="en-US"/>
           </a:p>
         </p:txBody>
       </p:sp>
@@ -2044,10 +2036,9 @@
           <a:lstStyle/>
           <a:p>
             <a:r>
-              <a:rPr lang="en-US" smtClean="0"/>
+              <a:rPr lang="en-US"/>
               <a:t>Click to edit Master title style</a:t>
             </a:r>
-            <a:endParaRPr lang="en-US"/>
           </a:p>
         </p:txBody>
       </p:sp>
@@ -2110,7 +2101,7 @@
           <a:p>
             <a:pPr lvl="0"/>
             <a:r>
-              <a:rPr lang="en-US" smtClean="0"/>
+              <a:rPr lang="en-US"/>
               <a:t>Click to edit Master text styles</a:t>
             </a:r>
           </a:p>
@@ -2138,38 +2129,37 @@
           <a:p>
             <a:pPr lvl="0"/>
             <a:r>
-              <a:rPr lang="en-US" smtClean="0"/>
+              <a:rPr lang="en-US"/>
               <a:t>Click to edit Master text styles</a:t>
             </a:r>
           </a:p>
           <a:p>
             <a:pPr lvl="1"/>
             <a:r>
-              <a:rPr lang="en-US" smtClean="0"/>
+              <a:rPr lang="en-US"/>
               <a:t>Second level</a:t>
             </a:r>
           </a:p>
           <a:p>
             <a:pPr lvl="2"/>
             <a:r>
-              <a:rPr lang="en-US" smtClean="0"/>
+              <a:rPr lang="en-US"/>
               <a:t>Third level</a:t>
             </a:r>
           </a:p>
           <a:p>
             <a:pPr lvl="3"/>
             <a:r>
-              <a:rPr lang="en-US" smtClean="0"/>
+              <a:rPr lang="en-US"/>
               <a:t>Fourth level</a:t>
             </a:r>
           </a:p>
           <a:p>
             <a:pPr lvl="4"/>
             <a:r>
-              <a:rPr lang="en-US" smtClean="0"/>
+              <a:rPr lang="en-US"/>
               <a:t>Fifth level</a:t>
             </a:r>
-            <a:endParaRPr lang="en-US"/>
           </a:p>
         </p:txBody>
       </p:sp>
@@ -2232,7 +2222,7 @@
           <a:p>
             <a:pPr lvl="0"/>
             <a:r>
-              <a:rPr lang="en-US" smtClean="0"/>
+              <a:rPr lang="en-US"/>
               <a:t>Click to edit Master text styles</a:t>
             </a:r>
           </a:p>
@@ -2260,38 +2250,37 @@
           <a:p>
             <a:pPr lvl="0"/>
             <a:r>
-              <a:rPr lang="en-US" smtClean="0"/>
+              <a:rPr lang="en-US"/>
               <a:t>Click to edit Master text styles</a:t>
             </a:r>
           </a:p>
           <a:p>
             <a:pPr lvl="1"/>
             <a:r>
-              <a:rPr lang="en-US" smtClean="0"/>
+              <a:rPr lang="en-US"/>
               <a:t>Second level</a:t>
             </a:r>
           </a:p>
           <a:p>
             <a:pPr lvl="2"/>
             <a:r>
-              <a:rPr lang="en-US" smtClean="0"/>
+              <a:rPr lang="en-US"/>
               <a:t>Third level</a:t>
             </a:r>
           </a:p>
           <a:p>
             <a:pPr lvl="3"/>
             <a:r>
-              <a:rPr lang="en-US" smtClean="0"/>
+              <a:rPr lang="en-US"/>
               <a:t>Fourth level</a:t>
             </a:r>
           </a:p>
           <a:p>
             <a:pPr lvl="4"/>
             <a:r>
-              <a:rPr lang="en-US" smtClean="0"/>
+              <a:rPr lang="en-US"/>
               <a:t>Fifth level</a:t>
             </a:r>
-            <a:endParaRPr lang="en-US"/>
           </a:p>
         </p:txBody>
       </p:sp>
@@ -2406,10 +2395,9 @@
           <a:lstStyle/>
           <a:p>
             <a:r>
-              <a:rPr lang="en-US" smtClean="0"/>
+              <a:rPr lang="en-US"/>
               <a:t>Click to edit Master title style</a:t>
             </a:r>
-            <a:endParaRPr lang="en-US"/>
           </a:p>
         </p:txBody>
       </p:sp>
@@ -2628,10 +2616,9 @@
           </a:lstStyle>
           <a:p>
             <a:r>
-              <a:rPr lang="en-US" smtClean="0"/>
+              <a:rPr lang="en-US"/>
               <a:t>Click to edit Master title style</a:t>
             </a:r>
-            <a:endParaRPr lang="en-US"/>
           </a:p>
         </p:txBody>
       </p:sp>
@@ -2685,38 +2672,37 @@
           <a:p>
             <a:pPr lvl="0"/>
             <a:r>
-              <a:rPr lang="en-US" smtClean="0"/>
+              <a:rPr lang="en-US"/>
               <a:t>Click to edit Master text styles</a:t>
             </a:r>
           </a:p>
           <a:p>
             <a:pPr lvl="1"/>
             <a:r>
-              <a:rPr lang="en-US" smtClean="0"/>
+              <a:rPr lang="en-US"/>
               <a:t>Second level</a:t>
             </a:r>
           </a:p>
           <a:p>
             <a:pPr lvl="2"/>
             <a:r>
-              <a:rPr lang="en-US" smtClean="0"/>
+              <a:rPr lang="en-US"/>
               <a:t>Third level</a:t>
             </a:r>
           </a:p>
           <a:p>
             <a:pPr lvl="3"/>
             <a:r>
-              <a:rPr lang="en-US" smtClean="0"/>
+              <a:rPr lang="en-US"/>
               <a:t>Fourth level</a:t>
             </a:r>
           </a:p>
           <a:p>
             <a:pPr lvl="4"/>
             <a:r>
-              <a:rPr lang="en-US" smtClean="0"/>
+              <a:rPr lang="en-US"/>
               <a:t>Fifth level</a:t>
             </a:r>
-            <a:endParaRPr lang="en-US"/>
           </a:p>
         </p:txBody>
       </p:sp>
@@ -2779,7 +2765,7 @@
           <a:p>
             <a:pPr lvl="0"/>
             <a:r>
-              <a:rPr lang="en-US" smtClean="0"/>
+              <a:rPr lang="en-US"/>
               <a:t>Click to edit Master text styles</a:t>
             </a:r>
           </a:p>
@@ -2905,10 +2891,9 @@
           </a:lstStyle>
           <a:p>
             <a:r>
-              <a:rPr lang="en-US" smtClean="0"/>
+              <a:rPr lang="en-US"/>
               <a:t>Click to edit Master title style</a:t>
             </a:r>
-            <a:endParaRPr lang="en-US"/>
           </a:p>
         </p:txBody>
       </p:sp>
@@ -3032,7 +3017,7 @@
           <a:p>
             <a:pPr lvl="0"/>
             <a:r>
-              <a:rPr lang="en-US" smtClean="0"/>
+              <a:rPr lang="en-US"/>
               <a:t>Click to edit Master text styles</a:t>
             </a:r>
           </a:p>
@@ -3167,10 +3152,9 @@
           <a:lstStyle/>
           <a:p>
             <a:r>
-              <a:rPr lang="en-US" smtClean="0"/>
+              <a:rPr lang="en-US"/>
               <a:t>Click to edit Master title style</a:t>
             </a:r>
-            <a:endParaRPr lang="en-US"/>
           </a:p>
         </p:txBody>
       </p:sp>
@@ -3201,38 +3185,37 @@
           <a:p>
             <a:pPr lvl="0"/>
             <a:r>
-              <a:rPr lang="en-US" smtClean="0"/>
+              <a:rPr lang="en-US"/>
               <a:t>Click to edit Master text styles</a:t>
             </a:r>
           </a:p>
           <a:p>
             <a:pPr lvl="1"/>
             <a:r>
-              <a:rPr lang="en-US" smtClean="0"/>
+              <a:rPr lang="en-US"/>
               <a:t>Second level</a:t>
             </a:r>
           </a:p>
           <a:p>
             <a:pPr lvl="2"/>
             <a:r>
-              <a:rPr lang="en-US" smtClean="0"/>
+              <a:rPr lang="en-US"/>
               <a:t>Third level</a:t>
             </a:r>
           </a:p>
           <a:p>
             <a:pPr lvl="3"/>
             <a:r>
-              <a:rPr lang="en-US" smtClean="0"/>
+              <a:rPr lang="en-US"/>
               <a:t>Fourth level</a:t>
             </a:r>
           </a:p>
           <a:p>
             <a:pPr lvl="4"/>
             <a:r>
-              <a:rPr lang="en-US" smtClean="0"/>
+              <a:rPr lang="en-US"/>
               <a:t>Fifth level</a:t>
             </a:r>
-            <a:endParaRPr lang="en-US"/>
           </a:p>
         </p:txBody>
       </p:sp>
@@ -3734,14 +3717,13 @@
           <a:bodyPr/>
           <a:lstStyle/>
           <a:p>
-            <a:endParaRPr lang="en-US" dirty="0" smtClean="0"/>
-          </a:p>
-          <a:p>
-            <a:r>
-              <a:rPr lang="en-US" dirty="0" smtClean="0"/>
+            <a:endParaRPr lang="en-US" dirty="0"/>
+          </a:p>
+          <a:p>
+            <a:r>
+              <a:rPr lang="en-US" dirty="0"/>
               <a:t>A World Where it is Titanic (the movie) All Day, Everyday</a:t>
             </a:r>
-            <a:endParaRPr lang="en-US" dirty="0"/>
           </a:p>
         </p:txBody>
       </p:sp>
@@ -3785,13 +3767,6 @@
   <p:clrMapOvr>
     <a:masterClrMapping/>
   </p:clrMapOvr>
-  <p:timing>
-    <p:tnLst>
-      <p:par>
-        <p:cTn id="1" dur="indefinite" restart="never" nodeType="tmRoot"/>
-      </p:par>
-    </p:tnLst>
-  </p:timing>
 </p:sld>
 </file>
 
@@ -3847,7 +3822,7 @@
           <a:p>
             <a:pPr algn="ctr"/>
             <a:r>
-              <a:rPr lang="en-US" dirty="0" smtClean="0"/>
+              <a:rPr lang="en-US" dirty="0"/>
               <a:t>Finally! Let’s talk about the most important algorithm of our website, the search algorithm. </a:t>
             </a:r>
           </a:p>
@@ -3858,10 +3833,9 @@
           <a:p>
             <a:pPr algn="ctr"/>
             <a:r>
-              <a:rPr lang="en-US" dirty="0" smtClean="0"/>
+              <a:rPr lang="en-US" dirty="0"/>
               <a:t>This little gem is the easiest way to scour our millions of titanic (the movie) collectibles. Search—and filter—to your heart(of the ocean)s content.</a:t>
             </a:r>
-            <a:endParaRPr lang="en-US" dirty="0"/>
           </a:p>
         </p:txBody>
       </p:sp>
@@ -3925,10 +3899,9 @@
           <a:p>
             <a:pPr algn="ctr"/>
             <a:r>
-              <a:rPr lang="en-US" dirty="0" smtClean="0"/>
+              <a:rPr lang="en-US" dirty="0"/>
               <a:t>Search the Store</a:t>
             </a:r>
-            <a:endParaRPr lang="en-US" dirty="0"/>
           </a:p>
         </p:txBody>
       </p:sp>
@@ -3961,6 +3934,36 @@
           </a:xfrm>
         </p:spPr>
       </p:pic>
+      <p:pic>
+        <p:nvPicPr>
+          <p:cNvPr id="7" name="Picture 6">
+            <a:extLst>
+              <a:ext uri="{FF2B5EF4-FFF2-40B4-BE49-F238E27FC236}">
+                <a16:creationId xmlns:a16="http://schemas.microsoft.com/office/drawing/2014/main" id="{2FAA3753-3DBC-4CF2-AD59-85951BAD28F4}"/>
+              </a:ext>
+            </a:extLst>
+          </p:cNvPr>
+          <p:cNvPicPr>
+            <a:picLocks noChangeAspect="1"/>
+          </p:cNvPicPr>
+          <p:nvPr/>
+        </p:nvPicPr>
+        <p:blipFill>
+          <a:blip r:embed="rId3"/>
+          <a:stretch>
+            <a:fillRect/>
+          </a:stretch>
+        </p:blipFill>
+        <p:spPr>
+          <a:xfrm>
+            <a:off x="6874383" y="1885950"/>
+            <a:ext cx="5017351" cy="3819944"/>
+          </a:xfrm>
+          <a:prstGeom prst="rect">
+            <a:avLst/>
+          </a:prstGeom>
+        </p:spPr>
+      </p:pic>
     </p:spTree>
     <p:extLst>
       <p:ext uri="{BB962C8B-B14F-4D97-AF65-F5344CB8AC3E}">
@@ -3971,13 +3974,6 @@
   <p:clrMapOvr>
     <a:masterClrMapping/>
   </p:clrMapOvr>
-  <p:timing>
-    <p:tnLst>
-      <p:par>
-        <p:cTn id="1" dur="indefinite" restart="never" nodeType="tmRoot"/>
-      </p:par>
-    </p:tnLst>
-  </p:timing>
 </p:sld>
 </file>
 
@@ -4033,7 +4029,7 @@
           <a:p>
             <a:pPr algn="ctr"/>
             <a:r>
-              <a:rPr lang="en-US" dirty="0" smtClean="0"/>
+              <a:rPr lang="en-US" dirty="0"/>
               <a:t>Now that you have found exactly the priceless work of art you want, you can view its glorious details and decide whether or not you want to add it to your cart. </a:t>
             </a:r>
           </a:p>
@@ -4099,10 +4095,9 @@
           <a:p>
             <a:pPr algn="ctr"/>
             <a:r>
-              <a:rPr lang="en-US" dirty="0" smtClean="0"/>
+              <a:rPr lang="en-US" dirty="0"/>
               <a:t>View Item</a:t>
             </a:r>
-            <a:endParaRPr lang="en-US" dirty="0"/>
           </a:p>
         </p:txBody>
       </p:sp>
@@ -4135,6 +4130,36 @@
           </a:xfrm>
         </p:spPr>
       </p:pic>
+      <p:pic>
+        <p:nvPicPr>
+          <p:cNvPr id="3" name="Picture 2">
+            <a:extLst>
+              <a:ext uri="{FF2B5EF4-FFF2-40B4-BE49-F238E27FC236}">
+                <a16:creationId xmlns:a16="http://schemas.microsoft.com/office/drawing/2014/main" id="{DB7ACE10-5D61-4D30-A1E9-4B142D11E0FC}"/>
+              </a:ext>
+            </a:extLst>
+          </p:cNvPr>
+          <p:cNvPicPr>
+            <a:picLocks noChangeAspect="1"/>
+          </p:cNvPicPr>
+          <p:nvPr/>
+        </p:nvPicPr>
+        <p:blipFill>
+          <a:blip r:embed="rId3"/>
+          <a:stretch>
+            <a:fillRect/>
+          </a:stretch>
+        </p:blipFill>
+        <p:spPr>
+          <a:xfrm>
+            <a:off x="240323" y="2261167"/>
+            <a:ext cx="5049166" cy="3524250"/>
+          </a:xfrm>
+          <a:prstGeom prst="rect">
+            <a:avLst/>
+          </a:prstGeom>
+        </p:spPr>
+      </p:pic>
     </p:spTree>
     <p:extLst>
       <p:ext uri="{BB962C8B-B14F-4D97-AF65-F5344CB8AC3E}">
@@ -4145,13 +4170,6 @@
   <p:clrMapOvr>
     <a:masterClrMapping/>
   </p:clrMapOvr>
-  <p:timing>
-    <p:tnLst>
-      <p:par>
-        <p:cTn id="1" dur="indefinite" restart="never" nodeType="tmRoot"/>
-      </p:par>
-    </p:tnLst>
-  </p:timing>
 </p:sld>
 </file>
 
@@ -4207,10 +4225,9 @@
           <a:p>
             <a:pPr algn="ctr"/>
             <a:r>
-              <a:rPr lang="en-US" dirty="0" smtClean="0"/>
+              <a:rPr lang="en-US" dirty="0"/>
               <a:t>Now let us look at the treasure trove you have decided to purchase today. Let the items glisten in your virtual basket and let all the world be envious at your spoils. </a:t>
             </a:r>
-            <a:endParaRPr lang="en-US" dirty="0"/>
           </a:p>
         </p:txBody>
       </p:sp>
@@ -4274,10 +4291,9 @@
           <a:p>
             <a:pPr algn="ctr"/>
             <a:r>
-              <a:rPr lang="en-US" dirty="0" smtClean="0"/>
+              <a:rPr lang="en-US" dirty="0"/>
               <a:t>View Cart</a:t>
             </a:r>
-            <a:endParaRPr lang="en-US" dirty="0"/>
           </a:p>
         </p:txBody>
       </p:sp>
@@ -4310,6 +4326,36 @@
           </a:xfrm>
         </p:spPr>
       </p:pic>
+      <p:pic>
+        <p:nvPicPr>
+          <p:cNvPr id="3" name="Picture 2">
+            <a:extLst>
+              <a:ext uri="{FF2B5EF4-FFF2-40B4-BE49-F238E27FC236}">
+                <a16:creationId xmlns:a16="http://schemas.microsoft.com/office/drawing/2014/main" id="{7FF73EC2-18F2-47FD-B55C-EEA8C0E202A7}"/>
+              </a:ext>
+            </a:extLst>
+          </p:cNvPr>
+          <p:cNvPicPr>
+            <a:picLocks noChangeAspect="1"/>
+          </p:cNvPicPr>
+          <p:nvPr/>
+        </p:nvPicPr>
+        <p:blipFill>
+          <a:blip r:embed="rId3"/>
+          <a:stretch>
+            <a:fillRect/>
+          </a:stretch>
+        </p:blipFill>
+        <p:spPr>
+          <a:xfrm>
+            <a:off x="6972245" y="2293560"/>
+            <a:ext cx="4919582" cy="3475792"/>
+          </a:xfrm>
+          <a:prstGeom prst="rect">
+            <a:avLst/>
+          </a:prstGeom>
+        </p:spPr>
+      </p:pic>
     </p:spTree>
     <p:extLst>
       <p:ext uri="{BB962C8B-B14F-4D97-AF65-F5344CB8AC3E}">
@@ -4320,13 +4366,6 @@
   <p:clrMapOvr>
     <a:masterClrMapping/>
   </p:clrMapOvr>
-  <p:timing>
-    <p:tnLst>
-      <p:par>
-        <p:cTn id="1" dur="indefinite" restart="never" nodeType="tmRoot"/>
-      </p:par>
-    </p:tnLst>
-  </p:timing>
 </p:sld>
 </file>
 
@@ -4382,15 +4421,15 @@
           <a:p>
             <a:pPr algn="ctr"/>
             <a:r>
-              <a:rPr lang="en-US" dirty="0" smtClean="0"/>
+              <a:rPr lang="en-US" dirty="0"/>
               <a:t>At last, the time has come! You can now purchase all of the items in your cart and have them delivered right to your doorstep</a:t>
             </a:r>
             <a:r>
-              <a:rPr lang="en-US" baseline="30000" dirty="0" smtClean="0"/>
+              <a:rPr lang="en-US" baseline="30000" dirty="0"/>
               <a:t>1</a:t>
             </a:r>
             <a:r>
-              <a:rPr lang="en-US" dirty="0" smtClean="0"/>
+              <a:rPr lang="en-US" dirty="0"/>
               <a:t>.</a:t>
             </a:r>
           </a:p>
@@ -4456,10 +4495,9 @@
           <a:p>
             <a:pPr algn="ctr"/>
             <a:r>
-              <a:rPr lang="en-US" dirty="0" smtClean="0"/>
+              <a:rPr lang="en-US" dirty="0"/>
               <a:t>Checkout</a:t>
             </a:r>
-            <a:endParaRPr lang="en-US" dirty="0"/>
           </a:p>
         </p:txBody>
       </p:sp>
@@ -4513,21 +4551,46 @@
           <a:lstStyle/>
           <a:p>
             <a:r>
-              <a:rPr lang="en-US" dirty="0" smtClean="0">
+              <a:rPr lang="en-US" dirty="0">
                 <a:solidFill>
                   <a:schemeClr val="bg1"/>
                 </a:solidFill>
               </a:rPr>
               <a:t>1. Nothing will be delivered. If you send us money and somehow it makes it to us you have done so as a donation for us creating this beautiful website. You're welcome.</a:t>
             </a:r>
-            <a:endParaRPr lang="en-US" dirty="0">
-              <a:solidFill>
-                <a:schemeClr val="bg1"/>
-              </a:solidFill>
-            </a:endParaRPr>
-          </a:p>
-        </p:txBody>
-      </p:sp>
+          </a:p>
+        </p:txBody>
+      </p:sp>
+      <p:pic>
+        <p:nvPicPr>
+          <p:cNvPr id="7" name="Picture 6">
+            <a:extLst>
+              <a:ext uri="{FF2B5EF4-FFF2-40B4-BE49-F238E27FC236}">
+                <a16:creationId xmlns:a16="http://schemas.microsoft.com/office/drawing/2014/main" id="{BE2A0717-9D8F-4E6F-BCA7-E490B19C25FF}"/>
+              </a:ext>
+            </a:extLst>
+          </p:cNvPr>
+          <p:cNvPicPr>
+            <a:picLocks noChangeAspect="1"/>
+          </p:cNvPicPr>
+          <p:nvPr/>
+        </p:nvPicPr>
+        <p:blipFill>
+          <a:blip r:embed="rId4"/>
+          <a:stretch>
+            <a:fillRect/>
+          </a:stretch>
+        </p:blipFill>
+        <p:spPr>
+          <a:xfrm>
+            <a:off x="337350" y="2294904"/>
+            <a:ext cx="4850298" cy="3426840"/>
+          </a:xfrm>
+          <a:prstGeom prst="rect">
+            <a:avLst/>
+          </a:prstGeom>
+        </p:spPr>
+      </p:pic>
     </p:spTree>
     <p:extLst>
       <p:ext uri="{BB962C8B-B14F-4D97-AF65-F5344CB8AC3E}">
@@ -4538,13 +4601,6 @@
   <p:clrMapOvr>
     <a:masterClrMapping/>
   </p:clrMapOvr>
-  <p:timing>
-    <p:tnLst>
-      <p:par>
-        <p:cTn id="1" dur="indefinite" restart="never" nodeType="tmRoot"/>
-      </p:par>
-    </p:tnLst>
-  </p:timing>
 </p:sld>
 </file>
 
@@ -4600,10 +4656,9 @@
           <a:p>
             <a:pPr algn="ctr"/>
             <a:r>
-              <a:rPr lang="en-US" dirty="0" smtClean="0"/>
+              <a:rPr lang="en-US" dirty="0"/>
               <a:t>Finally, you can look back upon what you have purchased previously and wonder why you ever went a day without some of these items. </a:t>
             </a:r>
-            <a:endParaRPr lang="en-US" dirty="0"/>
           </a:p>
         </p:txBody>
       </p:sp>
@@ -4667,10 +4722,9 @@
           <a:p>
             <a:pPr algn="ctr"/>
             <a:r>
-              <a:rPr lang="en-US" dirty="0" smtClean="0"/>
+              <a:rPr lang="en-US" dirty="0"/>
               <a:t>View Orders</a:t>
             </a:r>
-            <a:endParaRPr lang="en-US" dirty="0"/>
           </a:p>
         </p:txBody>
       </p:sp>
@@ -4703,6 +4757,36 @@
           </a:xfrm>
         </p:spPr>
       </p:pic>
+      <p:pic>
+        <p:nvPicPr>
+          <p:cNvPr id="3" name="Picture 2">
+            <a:extLst>
+              <a:ext uri="{FF2B5EF4-FFF2-40B4-BE49-F238E27FC236}">
+                <a16:creationId xmlns:a16="http://schemas.microsoft.com/office/drawing/2014/main" id="{FB86FE3C-5F15-43AC-BB20-89E98A7ABEE2}"/>
+              </a:ext>
+            </a:extLst>
+          </p:cNvPr>
+          <p:cNvPicPr>
+            <a:picLocks noChangeAspect="1"/>
+          </p:cNvPicPr>
+          <p:nvPr/>
+        </p:nvPicPr>
+        <p:blipFill>
+          <a:blip r:embed="rId3"/>
+          <a:stretch>
+            <a:fillRect/>
+          </a:stretch>
+        </p:blipFill>
+        <p:spPr>
+          <a:xfrm>
+            <a:off x="7033847" y="2340768"/>
+            <a:ext cx="4785946" cy="3381375"/>
+          </a:xfrm>
+          <a:prstGeom prst="rect">
+            <a:avLst/>
+          </a:prstGeom>
+        </p:spPr>
+      </p:pic>
     </p:spTree>
     <p:extLst>
       <p:ext uri="{BB962C8B-B14F-4D97-AF65-F5344CB8AC3E}">
@@ -4713,13 +4797,6 @@
   <p:clrMapOvr>
     <a:masterClrMapping/>
   </p:clrMapOvr>
-  <p:timing>
-    <p:tnLst>
-      <p:par>
-        <p:cTn id="1" dur="indefinite" restart="never" nodeType="tmRoot"/>
-      </p:par>
-    </p:tnLst>
-  </p:timing>
 </p:sld>
 </file>
 
@@ -4775,7 +4852,7 @@
           <a:p>
             <a:pPr algn="ctr"/>
             <a:r>
-              <a:rPr lang="en-US" dirty="0" smtClean="0"/>
+              <a:rPr lang="en-US" dirty="0"/>
               <a:t>Generates global variables for help with database querying.</a:t>
             </a:r>
           </a:p>
@@ -4841,17 +4918,16 @@
           <a:p>
             <a:pPr algn="ctr"/>
             <a:r>
-              <a:rPr lang="en-US" dirty="0" smtClean="0"/>
+              <a:rPr lang="en-US" dirty="0"/>
               <a:t>Backend – </a:t>
             </a:r>
             <a:br>
-              <a:rPr lang="en-US" dirty="0" smtClean="0"/>
+              <a:rPr lang="en-US" dirty="0"/>
             </a:br>
             <a:r>
-              <a:rPr lang="en-US" dirty="0" smtClean="0"/>
+              <a:rPr lang="en-US" dirty="0"/>
               <a:t>Login Helper</a:t>
             </a:r>
-            <a:endParaRPr lang="en-US" dirty="0"/>
           </a:p>
         </p:txBody>
       </p:sp>
@@ -4918,13 +4994,6 @@
   <p:clrMapOvr>
     <a:masterClrMapping/>
   </p:clrMapOvr>
-  <p:timing>
-    <p:tnLst>
-      <p:par>
-        <p:cTn id="1" dur="indefinite" restart="never" nodeType="tmRoot"/>
-      </p:par>
-    </p:tnLst>
-  </p:timing>
 </p:sld>
 </file>
 
@@ -4980,10 +5049,9 @@
           <a:p>
             <a:pPr algn="ctr"/>
             <a:r>
-              <a:rPr lang="en-US" dirty="0" smtClean="0"/>
+              <a:rPr lang="en-US" dirty="0"/>
               <a:t>The user class employs the database by both storing local class variables with the users data (for sessions) and in the database (for security and organization).</a:t>
             </a:r>
-            <a:endParaRPr lang="en-US" dirty="0" smtClean="0"/>
           </a:p>
         </p:txBody>
       </p:sp>
@@ -5047,17 +5115,16 @@
           <a:p>
             <a:pPr algn="ctr"/>
             <a:r>
-              <a:rPr lang="en-US" dirty="0" smtClean="0"/>
+              <a:rPr lang="en-US" dirty="0"/>
               <a:t>Backend – </a:t>
             </a:r>
             <a:br>
-              <a:rPr lang="en-US" dirty="0" smtClean="0"/>
+              <a:rPr lang="en-US" dirty="0"/>
             </a:br>
             <a:r>
-              <a:rPr lang="en-US" dirty="0" smtClean="0"/>
+              <a:rPr lang="en-US" dirty="0"/>
               <a:t>User Class</a:t>
             </a:r>
-            <a:endParaRPr lang="en-US" dirty="0"/>
           </a:p>
         </p:txBody>
       </p:sp>
@@ -5124,13 +5191,6 @@
   <p:clrMapOvr>
     <a:masterClrMapping/>
   </p:clrMapOvr>
-  <p:timing>
-    <p:tnLst>
-      <p:par>
-        <p:cTn id="1" dur="indefinite" restart="never" nodeType="tmRoot"/>
-      </p:par>
-    </p:tnLst>
-  </p:timing>
 </p:sld>
 </file>
 
@@ -5186,7 +5246,7 @@
           <a:p>
             <a:pPr algn="ctr"/>
             <a:r>
-              <a:rPr lang="en-US" dirty="0" smtClean="0"/>
+              <a:rPr lang="en-US" dirty="0"/>
               <a:t>An expertly implemented search algorithm that uses both keywords and filters to find the perfect item to fit any occasion. </a:t>
             </a:r>
           </a:p>
@@ -5252,17 +5312,16 @@
           <a:p>
             <a:pPr algn="ctr"/>
             <a:r>
-              <a:rPr lang="en-US" dirty="0" smtClean="0"/>
+              <a:rPr lang="en-US" dirty="0"/>
               <a:t>Backend – </a:t>
             </a:r>
             <a:br>
-              <a:rPr lang="en-US" dirty="0" smtClean="0"/>
+              <a:rPr lang="en-US" dirty="0"/>
             </a:br>
             <a:r>
-              <a:rPr lang="en-US" dirty="0" smtClean="0"/>
+              <a:rPr lang="en-US" dirty="0"/>
               <a:t>Search Class</a:t>
             </a:r>
-            <a:endParaRPr lang="en-US" dirty="0"/>
           </a:p>
         </p:txBody>
       </p:sp>
@@ -5329,13 +5388,6 @@
   <p:clrMapOvr>
     <a:masterClrMapping/>
   </p:clrMapOvr>
-  <p:timing>
-    <p:tnLst>
-      <p:par>
-        <p:cTn id="1" dur="indefinite" restart="never" nodeType="tmRoot"/>
-      </p:par>
-    </p:tnLst>
-  </p:timing>
 </p:sld>
 </file>
 
@@ -5391,10 +5443,9 @@
           <a:p>
             <a:pPr algn="ctr"/>
             <a:r>
-              <a:rPr lang="en-US" dirty="0" smtClean="0"/>
+              <a:rPr lang="en-US" dirty="0"/>
               <a:t>The item class uses the database to both store the item in the database and set instantiated variables to make accessing item specific qualities easy. </a:t>
             </a:r>
-            <a:endParaRPr lang="en-US" dirty="0" smtClean="0"/>
           </a:p>
         </p:txBody>
       </p:sp>
@@ -5458,17 +5509,16 @@
           <a:p>
             <a:pPr algn="ctr"/>
             <a:r>
-              <a:rPr lang="en-US" dirty="0" smtClean="0"/>
+              <a:rPr lang="en-US" dirty="0"/>
               <a:t>Backend – </a:t>
             </a:r>
             <a:br>
-              <a:rPr lang="en-US" dirty="0" smtClean="0"/>
+              <a:rPr lang="en-US" dirty="0"/>
             </a:br>
             <a:r>
-              <a:rPr lang="en-US" dirty="0" smtClean="0"/>
+              <a:rPr lang="en-US" dirty="0"/>
               <a:t>Item Class</a:t>
             </a:r>
-            <a:endParaRPr lang="en-US" dirty="0"/>
           </a:p>
         </p:txBody>
       </p:sp>
@@ -5535,13 +5585,6 @@
   <p:clrMapOvr>
     <a:masterClrMapping/>
   </p:clrMapOvr>
-  <p:timing>
-    <p:tnLst>
-      <p:par>
-        <p:cTn id="1" dur="indefinite" restart="never" nodeType="tmRoot"/>
-      </p:par>
-    </p:tnLst>
-  </p:timing>
 </p:sld>
 </file>
 
@@ -5597,7 +5640,7 @@
           <a:p>
             <a:pPr algn="ctr"/>
             <a:r>
-              <a:rPr lang="en-US" dirty="0" smtClean="0"/>
+              <a:rPr lang="en-US" dirty="0"/>
               <a:t>The cart class stores all of the users items in cart to the database and sets instantiated variables to make accessing and performing methods easier.</a:t>
             </a:r>
           </a:p>
@@ -5663,17 +5706,16 @@
           <a:p>
             <a:pPr algn="ctr"/>
             <a:r>
-              <a:rPr lang="en-US" dirty="0" smtClean="0"/>
+              <a:rPr lang="en-US" dirty="0"/>
               <a:t>Backend – </a:t>
             </a:r>
             <a:br>
-              <a:rPr lang="en-US" dirty="0" smtClean="0"/>
+              <a:rPr lang="en-US" dirty="0"/>
             </a:br>
             <a:r>
-              <a:rPr lang="en-US" dirty="0" smtClean="0"/>
+              <a:rPr lang="en-US" dirty="0"/>
               <a:t>Cart Class</a:t>
             </a:r>
-            <a:endParaRPr lang="en-US" dirty="0"/>
           </a:p>
         </p:txBody>
       </p:sp>
@@ -5740,13 +5782,6 @@
   <p:clrMapOvr>
     <a:masterClrMapping/>
   </p:clrMapOvr>
-  <p:timing>
-    <p:tnLst>
-      <p:par>
-        <p:cTn id="1" dur="indefinite" restart="never" nodeType="tmRoot"/>
-      </p:par>
-    </p:tnLst>
-  </p:timing>
 </p:sld>
 </file>
 
@@ -5802,10 +5837,9 @@
           <a:p>
             <a:pPr algn="ctr"/>
             <a:r>
-              <a:rPr lang="en-US" dirty="0" smtClean="0"/>
-              <a:t>The home page is the heart of the operation, so to speak. It is your chance to make a first impression, but also a lasting one. We ended up spending a lot of time on the design of this page so as to really make a great impression. </a:t>
-            </a:r>
-            <a:endParaRPr lang="en-US" dirty="0"/>
+              <a:rPr lang="en-US" dirty="0"/>
+              <a:t>The home page is the heart of the operation, so to speak. It is your chance to make a first impression, but also a lasting one. We ended up spending a lot of time on the design of this page so as to really make a great impression. We drew inspiration from Amazon for most of the website. </a:t>
+            </a:r>
           </a:p>
         </p:txBody>
       </p:sp>
@@ -5869,10 +5903,9 @@
           <a:p>
             <a:pPr algn="ctr"/>
             <a:r>
-              <a:rPr lang="en-US" dirty="0" smtClean="0"/>
+              <a:rPr lang="en-US" dirty="0"/>
               <a:t>Home Page</a:t>
             </a:r>
-            <a:endParaRPr lang="en-US" dirty="0"/>
           </a:p>
         </p:txBody>
       </p:sp>
@@ -5905,6 +5938,36 @@
           </a:xfrm>
         </p:spPr>
       </p:pic>
+      <p:pic>
+        <p:nvPicPr>
+          <p:cNvPr id="3" name="Picture 2">
+            <a:extLst>
+              <a:ext uri="{FF2B5EF4-FFF2-40B4-BE49-F238E27FC236}">
+                <a16:creationId xmlns:a16="http://schemas.microsoft.com/office/drawing/2014/main" id="{CED8E15E-553A-49F8-8DBE-FEC134F2FDEB}"/>
+              </a:ext>
+            </a:extLst>
+          </p:cNvPr>
+          <p:cNvPicPr>
+            <a:picLocks noChangeAspect="1"/>
+          </p:cNvPicPr>
+          <p:nvPr/>
+        </p:nvPicPr>
+        <p:blipFill>
+          <a:blip r:embed="rId3"/>
+          <a:stretch>
+            <a:fillRect/>
+          </a:stretch>
+        </p:blipFill>
+        <p:spPr>
+          <a:xfrm>
+            <a:off x="6808031" y="914400"/>
+            <a:ext cx="5183944" cy="5029200"/>
+          </a:xfrm>
+          <a:prstGeom prst="rect">
+            <a:avLst/>
+          </a:prstGeom>
+        </p:spPr>
+      </p:pic>
     </p:spTree>
     <p:extLst>
       <p:ext uri="{BB962C8B-B14F-4D97-AF65-F5344CB8AC3E}">
@@ -5915,13 +5978,6 @@
   <p:clrMapOvr>
     <a:masterClrMapping/>
   </p:clrMapOvr>
-  <p:timing>
-    <p:tnLst>
-      <p:par>
-        <p:cTn id="1" dur="indefinite" restart="never" nodeType="tmRoot"/>
-      </p:par>
-    </p:tnLst>
-  </p:timing>
 </p:sld>
 </file>
 
@@ -5977,14 +6033,9 @@
           <a:p>
             <a:pPr algn="ctr"/>
             <a:r>
-              <a:rPr lang="en-US" dirty="0" smtClean="0"/>
-              <a:t>The order clas</a:t>
-            </a:r>
-            <a:r>
-              <a:rPr lang="en-US" dirty="0" smtClean="0"/>
-              <a:t>s stores all of the users orders in the database and allows for methods to be used to access and display said information to the user. </a:t>
-            </a:r>
-            <a:endParaRPr lang="en-US" dirty="0" smtClean="0"/>
+              <a:rPr lang="en-US" dirty="0"/>
+              <a:t>The order class stores all of a users order in the database and allows for methods to be used to access and display said information.</a:t>
+            </a:r>
           </a:p>
         </p:txBody>
       </p:sp>
@@ -6048,17 +6099,16 @@
           <a:p>
             <a:pPr algn="ctr"/>
             <a:r>
-              <a:rPr lang="en-US" dirty="0" smtClean="0"/>
+              <a:rPr lang="en-US" dirty="0"/>
               <a:t>Backend – </a:t>
             </a:r>
             <a:br>
-              <a:rPr lang="en-US" dirty="0" smtClean="0"/>
+              <a:rPr lang="en-US" dirty="0"/>
             </a:br>
             <a:r>
-              <a:rPr lang="en-US" dirty="0" smtClean="0"/>
+              <a:rPr lang="en-US" dirty="0"/>
               <a:t>Order Class</a:t>
             </a:r>
-            <a:endParaRPr lang="en-US" dirty="0"/>
           </a:p>
         </p:txBody>
       </p:sp>
@@ -6125,13 +6175,6 @@
   <p:clrMapOvr>
     <a:masterClrMapping/>
   </p:clrMapOvr>
-  <p:timing>
-    <p:tnLst>
-      <p:par>
-        <p:cTn id="1" dur="indefinite" restart="never" nodeType="tmRoot"/>
-      </p:par>
-    </p:tnLst>
-  </p:timing>
 </p:sld>
 </file>
 
@@ -6210,33 +6253,31 @@
           <a:bodyPr/>
           <a:lstStyle/>
           <a:p>
-            <a:endParaRPr lang="en-US" dirty="0" smtClean="0"/>
-          </a:p>
-          <a:p>
-            <a:r>
-              <a:rPr lang="en-US" dirty="0" smtClean="0"/>
+            <a:endParaRPr lang="en-US" dirty="0"/>
+          </a:p>
+          <a:p>
+            <a:r>
+              <a:rPr lang="en-US" dirty="0"/>
               <a:t>References:</a:t>
             </a:r>
-            <a:endParaRPr lang="en-US" dirty="0"/>
-          </a:p>
-          <a:p>
-            <a:r>
-              <a:rPr lang="en-US" dirty="0" smtClean="0"/>
+          </a:p>
+          <a:p>
+            <a:r>
+              <a:rPr lang="en-US" dirty="0"/>
               <a:t>W3 Schools – super helpful</a:t>
             </a:r>
           </a:p>
           <a:p>
             <a:r>
-              <a:rPr lang="en-US" dirty="0" smtClean="0"/>
+              <a:rPr lang="en-US" dirty="0"/>
               <a:t>Textbook – helped with some class issues</a:t>
             </a:r>
           </a:p>
           <a:p>
             <a:r>
-              <a:rPr lang="en-US" dirty="0" smtClean="0"/>
+              <a:rPr lang="en-US" dirty="0"/>
               <a:t>The Power of Friendship – helped us keep calm and code on</a:t>
             </a:r>
-            <a:endParaRPr lang="en-US" dirty="0"/>
           </a:p>
         </p:txBody>
       </p:sp>
@@ -6280,13 +6321,6 @@
   <p:clrMapOvr>
     <a:masterClrMapping/>
   </p:clrMapOvr>
-  <p:timing>
-    <p:tnLst>
-      <p:par>
-        <p:cTn id="1" dur="indefinite" restart="never" nodeType="tmRoot"/>
-      </p:par>
-    </p:tnLst>
-  </p:timing>
 </p:sld>
 </file>
 
@@ -6342,10 +6376,9 @@
           <a:p>
             <a:pPr algn="ctr"/>
             <a:r>
-              <a:rPr lang="en-US" dirty="0" smtClean="0"/>
-              <a:t>Arguably the second most important page. We wanted a simple and clean design for this form. We drew inspiration from amazon for most of the website but for this one in particular mores.</a:t>
-            </a:r>
-            <a:endParaRPr lang="en-US" dirty="0"/>
+              <a:rPr lang="en-US" dirty="0"/>
+              <a:t>Arguably the second most important page. We wanted a simple and clean design for this form similar to Amazon. </a:t>
+            </a:r>
           </a:p>
         </p:txBody>
       </p:sp>
@@ -6409,10 +6442,9 @@
           <a:p>
             <a:pPr algn="ctr"/>
             <a:r>
-              <a:rPr lang="en-US" dirty="0" smtClean="0"/>
+              <a:rPr lang="en-US" dirty="0"/>
               <a:t>Login</a:t>
             </a:r>
-            <a:endParaRPr lang="en-US" dirty="0"/>
           </a:p>
         </p:txBody>
       </p:sp>
@@ -6445,6 +6477,36 @@
           </a:xfrm>
         </p:spPr>
       </p:pic>
+      <p:pic>
+        <p:nvPicPr>
+          <p:cNvPr id="3" name="Picture 2">
+            <a:extLst>
+              <a:ext uri="{FF2B5EF4-FFF2-40B4-BE49-F238E27FC236}">
+                <a16:creationId xmlns:a16="http://schemas.microsoft.com/office/drawing/2014/main" id="{2F08A9B2-871C-42EC-B84D-0DEAC1FD07D4}"/>
+              </a:ext>
+            </a:extLst>
+          </p:cNvPr>
+          <p:cNvPicPr>
+            <a:picLocks noChangeAspect="1"/>
+          </p:cNvPicPr>
+          <p:nvPr/>
+        </p:nvPicPr>
+        <p:blipFill>
+          <a:blip r:embed="rId3"/>
+          <a:stretch>
+            <a:fillRect/>
+          </a:stretch>
+        </p:blipFill>
+        <p:spPr>
+          <a:xfrm>
+            <a:off x="271817" y="976312"/>
+            <a:ext cx="5056309" cy="4905375"/>
+          </a:xfrm>
+          <a:prstGeom prst="rect">
+            <a:avLst/>
+          </a:prstGeom>
+        </p:spPr>
+      </p:pic>
     </p:spTree>
     <p:extLst>
       <p:ext uri="{BB962C8B-B14F-4D97-AF65-F5344CB8AC3E}">
@@ -6455,13 +6517,6 @@
   <p:clrMapOvr>
     <a:masterClrMapping/>
   </p:clrMapOvr>
-  <p:timing>
-    <p:tnLst>
-      <p:par>
-        <p:cTn id="1" dur="indefinite" restart="never" nodeType="tmRoot"/>
-      </p:par>
-    </p:tnLst>
-  </p:timing>
 </p:sld>
 </file>
 
@@ -6517,7 +6572,7 @@
           <a:p>
             <a:pPr algn="ctr"/>
             <a:r>
-              <a:rPr lang="en-US" dirty="0" smtClean="0"/>
+              <a:rPr lang="en-US" dirty="0"/>
               <a:t>After login, obviously comes create account. For how can you login without an account? Well, you obviously can because you have the info. </a:t>
             </a:r>
           </a:p>
@@ -6528,10 +6583,9 @@
           <a:p>
             <a:pPr algn="ctr"/>
             <a:r>
-              <a:rPr lang="en-US" dirty="0" smtClean="0"/>
+              <a:rPr lang="en-US" dirty="0"/>
               <a:t>So, yeah. This is following the simple ideology of the other basic form pages. No need to clutter them up with the nav bar or anything like that.</a:t>
             </a:r>
-            <a:endParaRPr lang="en-US" dirty="0"/>
           </a:p>
         </p:txBody>
       </p:sp>
@@ -6595,10 +6649,9 @@
           <a:p>
             <a:pPr algn="ctr"/>
             <a:r>
-              <a:rPr lang="en-US" dirty="0" smtClean="0"/>
+              <a:rPr lang="en-US" dirty="0"/>
               <a:t>Create Account</a:t>
             </a:r>
-            <a:endParaRPr lang="en-US" dirty="0"/>
           </a:p>
         </p:txBody>
       </p:sp>
@@ -6631,6 +6684,36 @@
           </a:xfrm>
         </p:spPr>
       </p:pic>
+      <p:pic>
+        <p:nvPicPr>
+          <p:cNvPr id="7" name="Picture 6">
+            <a:extLst>
+              <a:ext uri="{FF2B5EF4-FFF2-40B4-BE49-F238E27FC236}">
+                <a16:creationId xmlns:a16="http://schemas.microsoft.com/office/drawing/2014/main" id="{86757E45-BB76-4F88-9600-CDBD70F6A8DE}"/>
+              </a:ext>
+            </a:extLst>
+          </p:cNvPr>
+          <p:cNvPicPr>
+            <a:picLocks noChangeAspect="1"/>
+          </p:cNvPicPr>
+          <p:nvPr/>
+        </p:nvPicPr>
+        <p:blipFill>
+          <a:blip r:embed="rId3"/>
+          <a:stretch>
+            <a:fillRect/>
+          </a:stretch>
+        </p:blipFill>
+        <p:spPr>
+          <a:xfrm>
+            <a:off x="6943466" y="958850"/>
+            <a:ext cx="5092309" cy="4940300"/>
+          </a:xfrm>
+          <a:prstGeom prst="rect">
+            <a:avLst/>
+          </a:prstGeom>
+        </p:spPr>
+      </p:pic>
     </p:spTree>
     <p:extLst>
       <p:ext uri="{BB962C8B-B14F-4D97-AF65-F5344CB8AC3E}">
@@ -6641,13 +6724,6 @@
   <p:clrMapOvr>
     <a:masterClrMapping/>
   </p:clrMapOvr>
-  <p:timing>
-    <p:tnLst>
-      <p:par>
-        <p:cTn id="1" dur="indefinite" restart="never" nodeType="tmRoot"/>
-      </p:par>
-    </p:tnLst>
-  </p:timing>
 </p:sld>
 </file>
 
@@ -6703,7 +6779,7 @@
           <a:p>
             <a:pPr algn="ctr"/>
             <a:r>
-              <a:rPr lang="en-US" dirty="0" smtClean="0"/>
+              <a:rPr lang="en-US" dirty="0"/>
               <a:t>Once you login or create your account, you will be redirected to the home page. From their you can click on Account to see your profile.</a:t>
             </a:r>
           </a:p>
@@ -6769,10 +6845,9 @@
           <a:p>
             <a:pPr algn="ctr"/>
             <a:r>
-              <a:rPr lang="en-US" dirty="0" smtClean="0"/>
+              <a:rPr lang="en-US" dirty="0"/>
               <a:t>View Profile</a:t>
             </a:r>
-            <a:endParaRPr lang="en-US" dirty="0"/>
           </a:p>
         </p:txBody>
       </p:sp>
@@ -6805,6 +6880,36 @@
           </a:xfrm>
         </p:spPr>
       </p:pic>
+      <p:pic>
+        <p:nvPicPr>
+          <p:cNvPr id="3" name="Picture 2">
+            <a:extLst>
+              <a:ext uri="{FF2B5EF4-FFF2-40B4-BE49-F238E27FC236}">
+                <a16:creationId xmlns:a16="http://schemas.microsoft.com/office/drawing/2014/main" id="{1D3522FE-984D-48F6-9886-4A51C5C726BB}"/>
+              </a:ext>
+            </a:extLst>
+          </p:cNvPr>
+          <p:cNvPicPr>
+            <a:picLocks noChangeAspect="1"/>
+          </p:cNvPicPr>
+          <p:nvPr/>
+        </p:nvPicPr>
+        <p:blipFill>
+          <a:blip r:embed="rId3"/>
+          <a:stretch>
+            <a:fillRect/>
+          </a:stretch>
+        </p:blipFill>
+        <p:spPr>
+          <a:xfrm>
+            <a:off x="331088" y="1877786"/>
+            <a:ext cx="4774147" cy="3421856"/>
+          </a:xfrm>
+          <a:prstGeom prst="rect">
+            <a:avLst/>
+          </a:prstGeom>
+        </p:spPr>
+      </p:pic>
     </p:spTree>
     <p:extLst>
       <p:ext uri="{BB962C8B-B14F-4D97-AF65-F5344CB8AC3E}">
@@ -6815,13 +6920,6 @@
   <p:clrMapOvr>
     <a:masterClrMapping/>
   </p:clrMapOvr>
-  <p:timing>
-    <p:tnLst>
-      <p:par>
-        <p:cTn id="1" dur="indefinite" restart="never" nodeType="tmRoot"/>
-      </p:par>
-    </p:tnLst>
-  </p:timing>
 </p:sld>
 </file>
 
@@ -6877,22 +6975,20 @@
           <a:p>
             <a:pPr algn="ctr"/>
             <a:r>
-              <a:rPr lang="en-US" dirty="0" smtClean="0"/>
+              <a:rPr lang="en-US" dirty="0"/>
               <a:t>Once you click on Account to view your profile there is a button to edit your profile information and/or avatar.</a:t>
             </a:r>
+          </a:p>
+          <a:p>
+            <a:pPr algn="ctr"/>
             <a:endParaRPr lang="en-US" dirty="0"/>
           </a:p>
           <a:p>
             <a:pPr algn="ctr"/>
-            <a:endParaRPr lang="en-US" dirty="0" smtClean="0"/>
-          </a:p>
-          <a:p>
-            <a:pPr algn="ctr"/>
-            <a:r>
-              <a:rPr lang="en-US" dirty="0" smtClean="0"/>
+            <a:r>
+              <a:rPr lang="en-US" dirty="0"/>
               <a:t>You can also delete your account from here, should you ever want to leave us (you won’t though)…</a:t>
             </a:r>
-            <a:endParaRPr lang="en-US" dirty="0"/>
           </a:p>
         </p:txBody>
       </p:sp>
@@ -6956,10 +7052,9 @@
           <a:p>
             <a:pPr algn="ctr"/>
             <a:r>
-              <a:rPr lang="en-US" dirty="0" smtClean="0"/>
+              <a:rPr lang="en-US" dirty="0"/>
               <a:t>Edit Profile</a:t>
             </a:r>
-            <a:endParaRPr lang="en-US" dirty="0"/>
           </a:p>
         </p:txBody>
       </p:sp>
@@ -6992,6 +7087,36 @@
           </a:xfrm>
         </p:spPr>
       </p:pic>
+      <p:pic>
+        <p:nvPicPr>
+          <p:cNvPr id="3" name="Picture 2">
+            <a:extLst>
+              <a:ext uri="{FF2B5EF4-FFF2-40B4-BE49-F238E27FC236}">
+                <a16:creationId xmlns:a16="http://schemas.microsoft.com/office/drawing/2014/main" id="{C25AD90A-07B3-4040-8BBF-211D3027B60D}"/>
+              </a:ext>
+            </a:extLst>
+          </p:cNvPr>
+          <p:cNvPicPr>
+            <a:picLocks noChangeAspect="1"/>
+          </p:cNvPicPr>
+          <p:nvPr/>
+        </p:nvPicPr>
+        <p:blipFill>
+          <a:blip r:embed="rId3"/>
+          <a:stretch>
+            <a:fillRect/>
+          </a:stretch>
+        </p:blipFill>
+        <p:spPr>
+          <a:xfrm>
+            <a:off x="7076164" y="523875"/>
+            <a:ext cx="4826913" cy="5438775"/>
+          </a:xfrm>
+          <a:prstGeom prst="rect">
+            <a:avLst/>
+          </a:prstGeom>
+        </p:spPr>
+      </p:pic>
     </p:spTree>
     <p:extLst>
       <p:ext uri="{BB962C8B-B14F-4D97-AF65-F5344CB8AC3E}">
@@ -7002,13 +7127,6 @@
   <p:clrMapOvr>
     <a:masterClrMapping/>
   </p:clrMapOvr>
-  <p:timing>
-    <p:tnLst>
-      <p:par>
-        <p:cTn id="1" dur="indefinite" restart="never" nodeType="tmRoot"/>
-      </p:par>
-    </p:tnLst>
-  </p:timing>
 </p:sld>
 </file>
 
@@ -7064,7 +7182,7 @@
           <a:p>
             <a:pPr algn="ctr"/>
             <a:r>
-              <a:rPr lang="en-US" dirty="0" smtClean="0"/>
+              <a:rPr lang="en-US" dirty="0"/>
               <a:t>All user accounts are also seller accounts. You can buy and sell to your hearts content here at Titanic Treasures. </a:t>
             </a:r>
           </a:p>
@@ -7075,7 +7193,7 @@
           <a:p>
             <a:pPr algn="ctr"/>
             <a:r>
-              <a:rPr lang="en-US" dirty="0" smtClean="0"/>
+              <a:rPr lang="en-US" dirty="0"/>
               <a:t>This is the page where you can view your inventory (the things people can buy from you).</a:t>
             </a:r>
           </a:p>
@@ -7141,10 +7259,9 @@
           <a:p>
             <a:pPr algn="ctr"/>
             <a:r>
-              <a:rPr lang="en-US" dirty="0" smtClean="0"/>
+              <a:rPr lang="en-US" dirty="0"/>
               <a:t>Inventory</a:t>
             </a:r>
-            <a:endParaRPr lang="en-US" dirty="0"/>
           </a:p>
         </p:txBody>
       </p:sp>
@@ -7177,6 +7294,36 @@
           </a:xfrm>
         </p:spPr>
       </p:pic>
+      <p:pic>
+        <p:nvPicPr>
+          <p:cNvPr id="3" name="Picture 2">
+            <a:extLst>
+              <a:ext uri="{FF2B5EF4-FFF2-40B4-BE49-F238E27FC236}">
+                <a16:creationId xmlns:a16="http://schemas.microsoft.com/office/drawing/2014/main" id="{BEC78A00-CC4B-41B9-BC30-0C99DB81A1BA}"/>
+              </a:ext>
+            </a:extLst>
+          </p:cNvPr>
+          <p:cNvPicPr>
+            <a:picLocks noChangeAspect="1"/>
+          </p:cNvPicPr>
+          <p:nvPr/>
+        </p:nvPicPr>
+        <p:blipFill>
+          <a:blip r:embed="rId3"/>
+          <a:stretch>
+            <a:fillRect/>
+          </a:stretch>
+        </p:blipFill>
+        <p:spPr>
+          <a:xfrm>
+            <a:off x="634170" y="2459779"/>
+            <a:ext cx="3909256" cy="2788495"/>
+          </a:xfrm>
+          <a:prstGeom prst="rect">
+            <a:avLst/>
+          </a:prstGeom>
+        </p:spPr>
+      </p:pic>
     </p:spTree>
     <p:extLst>
       <p:ext uri="{BB962C8B-B14F-4D97-AF65-F5344CB8AC3E}">
@@ -7187,13 +7334,6 @@
   <p:clrMapOvr>
     <a:masterClrMapping/>
   </p:clrMapOvr>
-  <p:timing>
-    <p:tnLst>
-      <p:par>
-        <p:cTn id="1" dur="indefinite" restart="never" nodeType="tmRoot"/>
-      </p:par>
-    </p:tnLst>
-  </p:timing>
 </p:sld>
 </file>
 
@@ -7249,10 +7389,9 @@
           <a:p>
             <a:pPr algn="ctr"/>
             <a:r>
-              <a:rPr lang="en-US" dirty="0" smtClean="0"/>
+              <a:rPr lang="en-US" dirty="0"/>
               <a:t>After viewing your inventory, if you discover you want to sell something else you can quickly add an item to the aforementioned inventory.</a:t>
             </a:r>
-            <a:endParaRPr lang="en-US" dirty="0"/>
           </a:p>
         </p:txBody>
       </p:sp>
@@ -7316,10 +7455,9 @@
           <a:p>
             <a:pPr algn="ctr"/>
             <a:r>
-              <a:rPr lang="en-US" dirty="0" smtClean="0"/>
+              <a:rPr lang="en-US" dirty="0"/>
               <a:t>Add Item</a:t>
             </a:r>
-            <a:endParaRPr lang="en-US" dirty="0"/>
           </a:p>
         </p:txBody>
       </p:sp>
@@ -7352,6 +7490,35 @@
           </a:xfrm>
         </p:spPr>
       </p:pic>
+      <p:pic>
+        <p:nvPicPr>
+          <p:cNvPr id="3" name="Picture 2">
+            <a:extLst>
+              <a:ext uri="{FF2B5EF4-FFF2-40B4-BE49-F238E27FC236}">
+                <a16:creationId xmlns:a16="http://schemas.microsoft.com/office/drawing/2014/main" id="{72053142-8833-442B-A8E0-E565EDDD5A50}"/>
+              </a:ext>
+            </a:extLst>
+          </p:cNvPr>
+          <p:cNvPicPr>
+            <a:picLocks noChangeAspect="1"/>
+          </p:cNvPicPr>
+          <p:nvPr/>
+        </p:nvPicPr>
+        <p:blipFill rotWithShape="1">
+          <a:blip r:embed="rId3"/>
+          <a:srcRect b="17917"/>
+          <a:stretch/>
+        </p:blipFill>
+        <p:spPr>
+          <a:xfrm>
+            <a:off x="7111292" y="1147762"/>
+            <a:ext cx="4756660" cy="4562475"/>
+          </a:xfrm>
+          <a:prstGeom prst="rect">
+            <a:avLst/>
+          </a:prstGeom>
+        </p:spPr>
+      </p:pic>
     </p:spTree>
     <p:extLst>
       <p:ext uri="{BB962C8B-B14F-4D97-AF65-F5344CB8AC3E}">
@@ -7362,13 +7529,6 @@
   <p:clrMapOvr>
     <a:masterClrMapping/>
   </p:clrMapOvr>
-  <p:timing>
-    <p:tnLst>
-      <p:par>
-        <p:cTn id="1" dur="indefinite" restart="never" nodeType="tmRoot"/>
-      </p:par>
-    </p:tnLst>
-  </p:timing>
 </p:sld>
 </file>
 
@@ -7424,7 +7584,7 @@
           <a:p>
             <a:pPr algn="ctr"/>
             <a:r>
-              <a:rPr lang="en-US" dirty="0" smtClean="0"/>
+              <a:rPr lang="en-US" dirty="0"/>
               <a:t>Once an item is added to your inventory, you can edit any and all attributes of said item. </a:t>
             </a:r>
           </a:p>
@@ -7435,7 +7595,7 @@
           <a:p>
             <a:pPr algn="ctr"/>
             <a:r>
-              <a:rPr lang="en-US" dirty="0" smtClean="0"/>
+              <a:rPr lang="en-US" dirty="0"/>
               <a:t>This is also where you can delete items from your inventory if you so choose to do so.</a:t>
             </a:r>
           </a:p>
@@ -7501,10 +7661,9 @@
           <a:p>
             <a:pPr algn="ctr"/>
             <a:r>
-              <a:rPr lang="en-US" dirty="0" smtClean="0"/>
+              <a:rPr lang="en-US" dirty="0"/>
               <a:t>Edit Item</a:t>
             </a:r>
-            <a:endParaRPr lang="en-US" dirty="0"/>
           </a:p>
         </p:txBody>
       </p:sp>
@@ -7537,6 +7696,35 @@
           </a:xfrm>
         </p:spPr>
       </p:pic>
+      <p:pic>
+        <p:nvPicPr>
+          <p:cNvPr id="3" name="Picture 2">
+            <a:extLst>
+              <a:ext uri="{FF2B5EF4-FFF2-40B4-BE49-F238E27FC236}">
+                <a16:creationId xmlns:a16="http://schemas.microsoft.com/office/drawing/2014/main" id="{2FDB04A7-5D63-4F1A-A52D-5BAF946640CA}"/>
+              </a:ext>
+            </a:extLst>
+          </p:cNvPr>
+          <p:cNvPicPr>
+            <a:picLocks noChangeAspect="1"/>
+          </p:cNvPicPr>
+          <p:nvPr/>
+        </p:nvPicPr>
+        <p:blipFill rotWithShape="1">
+          <a:blip r:embed="rId3"/>
+          <a:srcRect b="29166"/>
+          <a:stretch/>
+        </p:blipFill>
+        <p:spPr>
+          <a:xfrm>
+            <a:off x="274761" y="1989704"/>
+            <a:ext cx="4913736" cy="4067175"/>
+          </a:xfrm>
+          <a:prstGeom prst="rect">
+            <a:avLst/>
+          </a:prstGeom>
+        </p:spPr>
+      </p:pic>
     </p:spTree>
     <p:extLst>
       <p:ext uri="{BB962C8B-B14F-4D97-AF65-F5344CB8AC3E}">
@@ -7547,13 +7735,6 @@
   <p:clrMapOvr>
     <a:masterClrMapping/>
   </p:clrMapOvr>
-  <p:timing>
-    <p:tnLst>
-      <p:par>
-        <p:cTn id="1" dur="indefinite" restart="never" nodeType="tmRoot"/>
-      </p:par>
-    </p:tnLst>
-  </p:timing>
 </p:sld>
 </file>
 

</xml_diff>